<commit_message>
Week 12 Neural Networks
</commit_message>
<xml_diff>
--- a/An introduction to neural networks.pptx
+++ b/An introduction to neural networks.pptx
@@ -25,10 +25,13 @@
     <p:sldId id="270" r:id="rId19"/>
     <p:sldId id="271" r:id="rId20"/>
     <p:sldId id="272" r:id="rId21"/>
-    <p:sldId id="273" r:id="rId22"/>
-    <p:sldId id="274" r:id="rId23"/>
-    <p:sldId id="275" r:id="rId24"/>
-    <p:sldId id="276" r:id="rId25"/>
+    <p:sldId id="281" r:id="rId22"/>
+    <p:sldId id="273" r:id="rId23"/>
+    <p:sldId id="274" r:id="rId24"/>
+    <p:sldId id="279" r:id="rId25"/>
+    <p:sldId id="275" r:id="rId26"/>
+    <p:sldId id="280" r:id="rId27"/>
+    <p:sldId id="276" r:id="rId28"/>
   </p:sldIdLst>
   <p:sldSz cx="12192000" cy="6858000"/>
   <p:notesSz cx="7772400" cy="10058400"/>
@@ -3336,7 +3339,7 @@
                 </a:solidFill>
                 <a:latin typeface="Gill Sans MT"/>
               </a:rPr>
-              <a:t>4/15/2019</a:t>
+              <a:t>4/17/2019</a:t>
             </a:fld>
             <a:endParaRPr lang="en-US" sz="1000" b="0" strike="noStrike" spc="-1">
               <a:latin typeface="Times New Roman"/>
@@ -4278,7 +4281,7 @@
                 </a:solidFill>
                 <a:latin typeface="Gill Sans MT"/>
               </a:rPr>
-              <a:t>4/15/2019</a:t>
+              <a:t>4/17/2019</a:t>
             </a:fld>
             <a:endParaRPr lang="en-US" sz="1000" b="0" strike="noStrike" spc="-1">
               <a:latin typeface="Times New Roman"/>
@@ -7834,137 +7837,13 @@
       </p:sp>
       <p:sp>
         <p:nvSpPr>
-          <p:cNvPr id="140" name="TextShape 2"/>
-          <p:cNvSpPr txBox="1"/>
-          <p:nvPr/>
-        </p:nvSpPr>
-        <p:spPr>
-          <a:xfrm>
-            <a:off x="1451520" y="2015640"/>
-            <a:ext cx="4162320" cy="3450240"/>
-          </a:xfrm>
-          <a:prstGeom prst="rect">
-            <a:avLst/>
-          </a:prstGeom>
-          <a:noFill/>
-          <a:ln>
-            <a:noFill/>
-          </a:ln>
-        </p:spPr>
-        <p:txBody>
-          <a:bodyPr>
-            <a:normAutofit/>
-          </a:bodyPr>
-          <a:lstStyle/>
-          <a:p>
-            <a:pPr marL="228600" indent="-228240">
-              <a:lnSpc>
-                <a:spcPct val="120000"/>
-              </a:lnSpc>
-              <a:spcBef>
-                <a:spcPts val="1001"/>
-              </a:spcBef>
-              <a:buClr>
-                <a:srgbClr val="B71E42"/>
-              </a:buClr>
-              <a:buFont typeface="Arial"/>
-              <a:buChar char="•"/>
-            </a:pPr>
-            <a:r>
-              <a:rPr lang="en-US" sz="2000" b="0" strike="noStrike" spc="-1">
-                <a:solidFill>
-                  <a:srgbClr val="000000"/>
-                </a:solidFill>
-                <a:latin typeface="Gill Sans MT"/>
-              </a:rPr>
-              <a:t>Inputs: 0, 1</a:t>
-            </a:r>
-          </a:p>
-          <a:p>
-            <a:pPr marL="228600" indent="-228240">
-              <a:lnSpc>
-                <a:spcPct val="120000"/>
-              </a:lnSpc>
-              <a:spcBef>
-                <a:spcPts val="1001"/>
-              </a:spcBef>
-              <a:buClr>
-                <a:srgbClr val="B71E42"/>
-              </a:buClr>
-              <a:buFont typeface="Arial"/>
-              <a:buChar char="•"/>
-            </a:pPr>
-            <a:r>
-              <a:rPr lang="en-US" sz="2000" b="0" strike="noStrike" spc="-1">
-                <a:solidFill>
-                  <a:srgbClr val="000000"/>
-                </a:solidFill>
-                <a:latin typeface="Gill Sans MT"/>
-              </a:rPr>
-              <a:t>Node H</a:t>
-            </a:r>
-            <a:r>
-              <a:rPr lang="en-US" sz="2000" b="0" strike="noStrike" spc="-1" baseline="-25000">
-                <a:solidFill>
-                  <a:srgbClr val="000000"/>
-                </a:solidFill>
-                <a:latin typeface="Gill Sans MT"/>
-              </a:rPr>
-              <a:t>2</a:t>
-            </a:r>
-            <a:r>
-              <a:rPr lang="en-US" sz="2000" b="0" strike="noStrike" spc="-1">
-                <a:solidFill>
-                  <a:srgbClr val="000000"/>
-                </a:solidFill>
-                <a:latin typeface="Gill Sans MT"/>
-              </a:rPr>
-              <a:t>: </a:t>
-            </a:r>
-          </a:p>
-          <a:p>
-            <a:pPr>
-              <a:lnSpc>
-                <a:spcPct val="120000"/>
-              </a:lnSpc>
-              <a:spcBef>
-                <a:spcPts val="1001"/>
-              </a:spcBef>
-            </a:pPr>
-            <a:endParaRPr lang="en-US" sz="2000" b="0" strike="noStrike" spc="-1">
-              <a:solidFill>
-                <a:srgbClr val="000000"/>
-              </a:solidFill>
-              <a:latin typeface="Gill Sans MT"/>
-            </a:endParaRPr>
-          </a:p>
-          <a:p>
-            <a:pPr>
-              <a:lnSpc>
-                <a:spcPct val="120000"/>
-              </a:lnSpc>
-              <a:spcBef>
-                <a:spcPts val="1001"/>
-              </a:spcBef>
-            </a:pPr>
-            <a:endParaRPr lang="en-US" sz="2000" b="0" strike="noStrike" spc="-1">
-              <a:solidFill>
-                <a:srgbClr val="000000"/>
-              </a:solidFill>
-              <a:latin typeface="Gill Sans MT"/>
-            </a:endParaRPr>
-          </a:p>
-        </p:txBody>
-      </p:sp>
-      <p:sp>
-        <p:nvSpPr>
           <p:cNvPr id="141" name="TextShape 3"/>
           <p:cNvSpPr txBox="1"/>
           <p:nvPr/>
         </p:nvSpPr>
         <p:spPr>
           <a:xfrm>
-            <a:off x="1451520" y="2015640"/>
+            <a:off x="1451520" y="2264760"/>
             <a:ext cx="4162320" cy="3450240"/>
           </a:xfrm>
           <a:prstGeom prst="rect">
@@ -8137,27 +8016,30 @@
       </p:sp>
       <p:sp>
         <p:nvSpPr>
-          <p:cNvPr id="144" name="TextShape 2"/>
+          <p:cNvPr id="145" name="TextShape 3"/>
           <p:cNvSpPr txBox="1"/>
           <p:nvPr/>
         </p:nvSpPr>
         <p:spPr>
           <a:xfrm>
-            <a:off x="1451520" y="2015640"/>
+            <a:off x="1451520" y="2244240"/>
             <a:ext cx="4722480" cy="3450240"/>
           </a:xfrm>
           <a:prstGeom prst="rect">
             <a:avLst/>
           </a:prstGeom>
-          <a:noFill/>
+          <a:blipFill rotWithShape="0">
+            <a:blip r:embed="rId3"/>
+            <a:stretch>
+              <a:fillRect/>
+            </a:stretch>
+          </a:blipFill>
           <a:ln>
             <a:noFill/>
           </a:ln>
         </p:spPr>
         <p:txBody>
-          <a:bodyPr>
-            <a:normAutofit/>
-          </a:bodyPr>
+          <a:bodyPr/>
           <a:lstStyle/>
           <a:p>
             <a:pPr marL="228600" indent="-228240">
@@ -8174,121 +8056,12 @@
               <a:buChar char="•"/>
             </a:pPr>
             <a:r>
-              <a:rPr lang="en-US" sz="2000" b="0" strike="noStrike" spc="-1">
-                <a:solidFill>
-                  <a:srgbClr val="000000"/>
-                </a:solidFill>
-                <a:latin typeface="Gill Sans MT"/>
-              </a:rPr>
-              <a:t>Inputs: 0, 1</a:t>
-            </a:r>
-          </a:p>
-          <a:p>
-            <a:pPr marL="228600" indent="-228240">
-              <a:lnSpc>
-                <a:spcPct val="120000"/>
-              </a:lnSpc>
-              <a:spcBef>
-                <a:spcPts val="1001"/>
-              </a:spcBef>
-              <a:buClr>
-                <a:srgbClr val="B71E42"/>
-              </a:buClr>
-              <a:buFont typeface="Arial"/>
-              <a:buChar char="•"/>
-            </a:pPr>
-            <a:r>
-              <a:rPr lang="en-US" sz="2000" b="0" strike="noStrike" spc="-1">
-                <a:solidFill>
-                  <a:srgbClr val="000000"/>
-                </a:solidFill>
-                <a:latin typeface="Gill Sans MT"/>
-              </a:rPr>
-              <a:t>Node O: </a:t>
-            </a:r>
-          </a:p>
-          <a:p>
-            <a:pPr>
-              <a:lnSpc>
-                <a:spcPct val="120000"/>
-              </a:lnSpc>
-              <a:spcBef>
-                <a:spcPts val="1001"/>
-              </a:spcBef>
-            </a:pPr>
-            <a:endParaRPr lang="en-US" sz="2000" b="0" strike="noStrike" spc="-1">
-              <a:solidFill>
-                <a:srgbClr val="000000"/>
-              </a:solidFill>
-              <a:latin typeface="Gill Sans MT"/>
-            </a:endParaRPr>
-          </a:p>
-          <a:p>
-            <a:pPr>
-              <a:lnSpc>
-                <a:spcPct val="120000"/>
-              </a:lnSpc>
-              <a:spcBef>
-                <a:spcPts val="1001"/>
-              </a:spcBef>
-            </a:pPr>
-            <a:endParaRPr lang="en-US" sz="2000" b="0" strike="noStrike" spc="-1">
-              <a:solidFill>
-                <a:srgbClr val="000000"/>
-              </a:solidFill>
-              <a:latin typeface="Gill Sans MT"/>
-            </a:endParaRPr>
-          </a:p>
-        </p:txBody>
-      </p:sp>
-      <p:sp>
-        <p:nvSpPr>
-          <p:cNvPr id="145" name="TextShape 3"/>
-          <p:cNvSpPr txBox="1"/>
-          <p:nvPr/>
-        </p:nvSpPr>
-        <p:spPr>
-          <a:xfrm>
-            <a:off x="1451520" y="2015640"/>
-            <a:ext cx="4722480" cy="3450240"/>
-          </a:xfrm>
-          <a:prstGeom prst="rect">
-            <a:avLst/>
-          </a:prstGeom>
-          <a:blipFill rotWithShape="0">
-            <a:blip r:embed="rId3"/>
-            <a:stretch>
-              <a:fillRect/>
-            </a:stretch>
-          </a:blipFill>
-          <a:ln>
-            <a:noFill/>
-          </a:ln>
-        </p:spPr>
-        <p:txBody>
-          <a:bodyPr/>
-          <a:lstStyle/>
-          <a:p>
-            <a:pPr marL="228600" indent="-228240">
-              <a:lnSpc>
-                <a:spcPct val="120000"/>
-              </a:lnSpc>
-              <a:spcBef>
-                <a:spcPts val="1001"/>
-              </a:spcBef>
-              <a:buClr>
-                <a:srgbClr val="B71E42"/>
-              </a:buClr>
-              <a:buFont typeface="Arial"/>
-              <a:buChar char="•"/>
-            </a:pPr>
-            <a:r>
-              <a:rPr lang="en-US" sz="2000" b="0" strike="noStrike" spc="-1">
+              <a:rPr lang="en-US" sz="2000" b="0" strike="noStrike" spc="-1" dirty="0">
                 <a:latin typeface="Gill Sans MT"/>
               </a:rPr>
               <a:t> </a:t>
             </a:r>
-            <a:endParaRPr lang="en-US" sz="2000" b="0" strike="noStrike" spc="-1">
+            <a:endParaRPr lang="en-US" sz="2000" b="0" strike="noStrike" spc="-1" dirty="0">
               <a:solidFill>
                 <a:srgbClr val="000000"/>
               </a:solidFill>
@@ -8837,14 +8610,111 @@
       </p:grpSpPr>
       <p:sp>
         <p:nvSpPr>
-          <p:cNvPr id="150" name="TextShape 1"/>
-          <p:cNvSpPr txBox="1"/>
+          <p:cNvPr id="2" name="Title 1">
+            <a:extLst>
+              <a:ext uri="{FF2B5EF4-FFF2-40B4-BE49-F238E27FC236}">
+                <a16:creationId xmlns:a16="http://schemas.microsoft.com/office/drawing/2014/main" id="{3C032F79-68CF-420F-A8B8-FE55170EE570}"/>
+              </a:ext>
+            </a:extLst>
+          </p:cNvPr>
+          <p:cNvSpPr>
+            <a:spLocks noGrp="1"/>
+          </p:cNvSpPr>
+          <p:nvPr>
+            <p:ph type="title"/>
+          </p:nvPr>
+        </p:nvSpPr>
+        <p:spPr/>
+        <p:txBody>
+          <a:bodyPr/>
+          <a:lstStyle/>
+          <a:p>
+            <a:r>
+              <a:rPr lang="en-US" dirty="0"/>
+              <a:t>Example: RELU Activation</a:t>
+            </a:r>
+          </a:p>
+        </p:txBody>
+      </p:sp>
+      <p:sp>
+        <p:nvSpPr>
+          <p:cNvPr id="3" name="Subtitle 2">
+            <a:extLst>
+              <a:ext uri="{FF2B5EF4-FFF2-40B4-BE49-F238E27FC236}">
+                <a16:creationId xmlns:a16="http://schemas.microsoft.com/office/drawing/2014/main" id="{C476C216-84DF-4ABA-82D2-0F09E635FFF7}"/>
+              </a:ext>
+            </a:extLst>
+          </p:cNvPr>
+          <p:cNvSpPr>
+            <a:spLocks noGrp="1"/>
+          </p:cNvSpPr>
+          <p:nvPr>
+            <p:ph type="subTitle"/>
+          </p:nvPr>
+        </p:nvSpPr>
+        <p:spPr>
+          <a:xfrm>
+            <a:off x="1076960" y="2107080"/>
+            <a:ext cx="6258560" cy="3450240"/>
+          </a:xfrm>
+        </p:spPr>
+        <p:txBody>
+          <a:bodyPr/>
+          <a:lstStyle/>
+          <a:p>
+            <a:r>
+              <a:rPr lang="en-US" dirty="0"/>
+              <a:t>The figure on the right shows a neural network with one hidden layer with </a:t>
+            </a:r>
+            <a:r>
+              <a:rPr lang="en-US" dirty="0" err="1"/>
+              <a:t>ReLU</a:t>
+            </a:r>
+            <a:r>
+              <a:rPr lang="en-US" dirty="0"/>
+              <a:t> as activation function. </a:t>
+            </a:r>
+          </a:p>
+          <a:p>
+            <a:r>
+              <a:rPr lang="en-US" dirty="0"/>
+              <a:t>Given input (1, 1) and weights of the network, compute the input and output of each neuron in the hidden layer and the output layer (assume that all biases are zero).</a:t>
+            </a:r>
+          </a:p>
+          <a:p>
+            <a:endParaRPr lang="en-US" dirty="0"/>
+          </a:p>
+        </p:txBody>
+      </p:sp>
+      <p:pic>
+        <p:nvPicPr>
+          <p:cNvPr id="4" name="Picture 3">
+            <a:extLst>
+              <a:ext uri="{FF2B5EF4-FFF2-40B4-BE49-F238E27FC236}">
+                <a16:creationId xmlns:a16="http://schemas.microsoft.com/office/drawing/2014/main" id="{E2C81416-CC3B-40E8-95F1-23325FF08F82}"/>
+              </a:ext>
+            </a:extLst>
+          </p:cNvPr>
+          <p:cNvPicPr/>
           <p:nvPr/>
-        </p:nvSpPr>
-        <p:spPr>
-          <a:xfrm>
-            <a:off x="1451520" y="804600"/>
-            <a:ext cx="9603000" cy="1049040"/>
+        </p:nvPicPr>
+        <p:blipFill>
+          <a:blip r:embed="rId2" cstate="print">
+            <a:extLst>
+              <a:ext uri="{28A0092B-C50C-407E-A947-70E740481C1C}">
+                <a14:useLocalDpi xmlns:a14="http://schemas.microsoft.com/office/drawing/2010/main" val="0"/>
+              </a:ext>
+            </a:extLst>
+          </a:blip>
+          <a:srcRect/>
+          <a:stretch>
+            <a:fillRect/>
+          </a:stretch>
+        </p:blipFill>
+        <p:spPr bwMode="auto">
+          <a:xfrm>
+            <a:off x="7208325" y="1853640"/>
+            <a:ext cx="4730619" cy="3450240"/>
           </a:xfrm>
           <a:prstGeom prst="rect">
             <a:avLst/>
@@ -8854,291 +8724,17 @@
             <a:noFill/>
           </a:ln>
         </p:spPr>
-        <p:txBody>
-          <a:bodyPr/>
-          <a:lstStyle/>
-          <a:p>
-            <a:pPr>
-              <a:lnSpc>
-                <a:spcPct val="90000"/>
-              </a:lnSpc>
-            </a:pPr>
-            <a:r>
-              <a:rPr lang="en-US" sz="3200" b="0" strike="noStrike" cap="all" spc="-1">
-                <a:solidFill>
-                  <a:srgbClr val="000000"/>
-                </a:solidFill>
-                <a:latin typeface="Gill Sans MT"/>
-              </a:rPr>
-              <a:t>Training a neural network</a:t>
-            </a:r>
-            <a:endParaRPr lang="en-US" sz="3200" b="0" strike="noStrike" spc="-1">
-              <a:solidFill>
-                <a:srgbClr val="000000"/>
-              </a:solidFill>
-              <a:latin typeface="Gill Sans MT"/>
-            </a:endParaRPr>
-          </a:p>
-        </p:txBody>
-      </p:sp>
-      <p:sp>
-        <p:nvSpPr>
-          <p:cNvPr id="151" name="TextShape 2"/>
-          <p:cNvSpPr txBox="1"/>
-          <p:nvPr/>
-        </p:nvSpPr>
-        <p:spPr>
-          <a:xfrm>
-            <a:off x="810000" y="2015640"/>
-            <a:ext cx="10244520" cy="3450240"/>
-          </a:xfrm>
-          <a:prstGeom prst="rect">
-            <a:avLst/>
-          </a:prstGeom>
-          <a:noFill/>
-          <a:ln>
-            <a:noFill/>
-          </a:ln>
-        </p:spPr>
-        <p:txBody>
-          <a:bodyPr>
-            <a:normAutofit/>
-          </a:bodyPr>
-          <a:lstStyle/>
-          <a:p>
-            <a:pPr marL="228600" indent="-228240">
-              <a:lnSpc>
-                <a:spcPct val="120000"/>
-              </a:lnSpc>
-              <a:spcBef>
-                <a:spcPts val="1001"/>
-              </a:spcBef>
-              <a:buClr>
-                <a:srgbClr val="B71E42"/>
-              </a:buClr>
-              <a:buFont typeface="Arial"/>
-              <a:buChar char="•"/>
-            </a:pPr>
-            <a:r>
-              <a:rPr lang="en-US" sz="2000" b="0" strike="noStrike" spc="-1">
-                <a:solidFill>
-                  <a:srgbClr val="000000"/>
-                </a:solidFill>
-                <a:latin typeface="Gill Sans MT"/>
-              </a:rPr>
-              <a:t>Training set </a:t>
-            </a:r>
-          </a:p>
-          <a:p>
-            <a:pPr marL="228600" indent="-228240">
-              <a:lnSpc>
-                <a:spcPct val="120000"/>
-              </a:lnSpc>
-              <a:spcBef>
-                <a:spcPts val="1001"/>
-              </a:spcBef>
-              <a:buClr>
-                <a:srgbClr val="B71E42"/>
-              </a:buClr>
-              <a:buFont typeface="Arial"/>
-              <a:buChar char="•"/>
-            </a:pPr>
-            <a:r>
-              <a:rPr lang="en-US" sz="2000" b="0" strike="noStrike" spc="-1">
-                <a:solidFill>
-                  <a:srgbClr val="000000"/>
-                </a:solidFill>
-                <a:latin typeface="Gill Sans MT"/>
-              </a:rPr>
-              <a:t>Model prediction for is </a:t>
-            </a:r>
-          </a:p>
-          <a:p>
-            <a:pPr marL="228600" indent="-228240">
-              <a:lnSpc>
-                <a:spcPct val="120000"/>
-              </a:lnSpc>
-              <a:spcBef>
-                <a:spcPts val="1001"/>
-              </a:spcBef>
-              <a:buClr>
-                <a:srgbClr val="B71E42"/>
-              </a:buClr>
-              <a:buFont typeface="Arial"/>
-              <a:buChar char="•"/>
-            </a:pPr>
-            <a:r>
-              <a:rPr lang="en-US" sz="2000" b="0" strike="noStrike" spc="-1">
-                <a:solidFill>
-                  <a:srgbClr val="000000"/>
-                </a:solidFill>
-                <a:latin typeface="Gill Sans MT"/>
-              </a:rPr>
-              <a:t>Put a (square) cost to each prediction error: </a:t>
-            </a:r>
-          </a:p>
-          <a:p>
-            <a:pPr marL="228600" indent="-228240">
-              <a:lnSpc>
-                <a:spcPct val="120000"/>
-              </a:lnSpc>
-              <a:spcBef>
-                <a:spcPts val="1001"/>
-              </a:spcBef>
-              <a:buClr>
-                <a:srgbClr val="B71E42"/>
-              </a:buClr>
-              <a:buFont typeface="Arial"/>
-              <a:buChar char="•"/>
-            </a:pPr>
-            <a:r>
-              <a:rPr lang="en-US" sz="2000" b="0" strike="noStrike" spc="-1">
-                <a:solidFill>
-                  <a:srgbClr val="000000"/>
-                </a:solidFill>
-                <a:latin typeface="Gill Sans MT"/>
-              </a:rPr>
-              <a:t>Goal: find proper weights that minimize the average cost:  </a:t>
-            </a:r>
-          </a:p>
-          <a:p>
-            <a:pPr marL="228600" indent="-228240">
-              <a:lnSpc>
-                <a:spcPct val="120000"/>
-              </a:lnSpc>
-              <a:spcBef>
-                <a:spcPts val="1001"/>
-              </a:spcBef>
-              <a:buClr>
-                <a:srgbClr val="B71E42"/>
-              </a:buClr>
-              <a:buFont typeface="Arial"/>
-              <a:buChar char="•"/>
-            </a:pPr>
-            <a:r>
-              <a:rPr lang="en-US" sz="2000" b="0" strike="noStrike" spc="-1">
-                <a:solidFill>
-                  <a:srgbClr val="000000"/>
-                </a:solidFill>
-                <a:latin typeface="Gill Sans MT"/>
-              </a:rPr>
-              <a:t>Optimization method: (Stochastic) Gradient Descent</a:t>
-            </a:r>
-          </a:p>
-          <a:p>
-            <a:pPr marL="228600" indent="-228240">
-              <a:lnSpc>
-                <a:spcPct val="120000"/>
-              </a:lnSpc>
-              <a:spcBef>
-                <a:spcPts val="1001"/>
-              </a:spcBef>
-              <a:buClr>
-                <a:srgbClr val="B71E42"/>
-              </a:buClr>
-              <a:buFont typeface="Arial"/>
-              <a:buChar char="•"/>
-            </a:pPr>
-            <a:r>
-              <a:rPr lang="en-US" sz="2000" b="0" strike="noStrike" spc="-1">
-                <a:solidFill>
-                  <a:srgbClr val="000000"/>
-                </a:solidFill>
-                <a:latin typeface="Gill Sans MT"/>
-              </a:rPr>
-              <a:t>Challenge: How to compute all the gradients?</a:t>
-            </a:r>
-          </a:p>
-        </p:txBody>
-      </p:sp>
-      <p:sp>
-        <p:nvSpPr>
-          <p:cNvPr id="152" name="TextShape 3"/>
-          <p:cNvSpPr txBox="1"/>
-          <p:nvPr/>
-        </p:nvSpPr>
-        <p:spPr>
-          <a:xfrm>
-            <a:off x="810000" y="2015640"/>
-            <a:ext cx="10244520" cy="3450240"/>
-          </a:xfrm>
-          <a:prstGeom prst="rect">
-            <a:avLst/>
-          </a:prstGeom>
-          <a:blipFill rotWithShape="0">
-            <a:blip r:embed="rId2"/>
-            <a:stretch>
-              <a:fillRect/>
-            </a:stretch>
-          </a:blipFill>
-          <a:ln>
-            <a:noFill/>
-          </a:ln>
-        </p:spPr>
-        <p:txBody>
-          <a:bodyPr/>
-          <a:lstStyle/>
-          <a:p>
-            <a:pPr marL="228600" indent="-228240">
-              <a:lnSpc>
-                <a:spcPct val="120000"/>
-              </a:lnSpc>
-              <a:spcBef>
-                <a:spcPts val="1001"/>
-              </a:spcBef>
-              <a:buClr>
-                <a:srgbClr val="B71E42"/>
-              </a:buClr>
-              <a:buFont typeface="Arial"/>
-              <a:buChar char="•"/>
-            </a:pPr>
-            <a:r>
-              <a:rPr lang="en-US" sz="2000" b="0" strike="noStrike" spc="-1">
-                <a:latin typeface="Gill Sans MT"/>
-              </a:rPr>
-              <a:t> </a:t>
-            </a:r>
-            <a:endParaRPr lang="en-US" sz="2000" b="0" strike="noStrike" spc="-1">
-              <a:solidFill>
-                <a:srgbClr val="000000"/>
-              </a:solidFill>
-              <a:latin typeface="Gill Sans MT"/>
-            </a:endParaRPr>
-          </a:p>
-        </p:txBody>
-      </p:sp>
+      </p:pic>
     </p:spTree>
+    <p:extLst>
+      <p:ext uri="{BB962C8B-B14F-4D97-AF65-F5344CB8AC3E}">
+        <p14:creationId xmlns:p14="http://schemas.microsoft.com/office/powerpoint/2010/main" val="2027017370"/>
+      </p:ext>
+    </p:extLst>
   </p:cSld>
   <p:clrMapOvr>
     <a:masterClrMapping/>
   </p:clrMapOvr>
-  <p:timing>
-    <p:tnLst>
-      <p:par>
-        <p:cTn id="1" dur="indefinite" restart="never" nodeType="tmRoot">
-          <p:childTnLst>
-            <p:seq>
-              <p:cTn id="2" dur="indefinite" nodeType="mainSeq"/>
-              <p:prevCondLst>
-                <p:cond evt="onPrev" delay="0">
-                  <p:tgtEl>
-                    <p:sldTgt/>
-                  </p:tgtEl>
-                </p:cond>
-              </p:prevCondLst>
-              <p:nextCondLst>
-                <p:cond evt="onNext" delay="0">
-                  <p:tgtEl>
-                    <p:sldTgt/>
-                  </p:tgtEl>
-                </p:cond>
-              </p:nextCondLst>
-            </p:seq>
-          </p:childTnLst>
-        </p:cTn>
-      </p:par>
-    </p:tnLst>
-  </p:timing>
 </p:sld>
 </file>
 
@@ -9161,7 +8757,7 @@
       </p:grpSpPr>
       <p:sp>
         <p:nvSpPr>
-          <p:cNvPr id="153" name="TextShape 1"/>
+          <p:cNvPr id="150" name="TextShape 1"/>
           <p:cNvSpPr txBox="1"/>
           <p:nvPr/>
         </p:nvSpPr>
@@ -9194,7 +8790,7 @@
                 </a:solidFill>
                 <a:latin typeface="Gill Sans MT"/>
               </a:rPr>
-              <a:t>backpropagation</a:t>
+              <a:t>Training a neural network</a:t>
             </a:r>
             <a:endParaRPr lang="en-US" sz="3200" b="0" strike="noStrike" spc="-1">
               <a:solidFill>
@@ -9207,19 +8803,24 @@
       </p:sp>
       <p:sp>
         <p:nvSpPr>
-          <p:cNvPr id="154" name="TextShape 2"/>
+          <p:cNvPr id="152" name="TextShape 3"/>
           <p:cNvSpPr txBox="1"/>
           <p:nvPr/>
         </p:nvSpPr>
         <p:spPr>
           <a:xfrm>
-            <a:off x="1451520" y="2015640"/>
-            <a:ext cx="9603000" cy="3450240"/>
-          </a:xfrm>
-          <a:prstGeom prst="rect">
-            <a:avLst/>
-          </a:prstGeom>
-          <a:noFill/>
+            <a:off x="1130760" y="2254179"/>
+            <a:ext cx="10244520" cy="3450240"/>
+          </a:xfrm>
+          <a:prstGeom prst="rect">
+            <a:avLst/>
+          </a:prstGeom>
+          <a:blipFill rotWithShape="0">
+            <a:blip r:embed="rId2"/>
+            <a:stretch>
+              <a:fillRect/>
+            </a:stretch>
+          </a:blipFill>
           <a:ln>
             <a:noFill/>
           </a:ln>
@@ -9243,85 +8844,16 @@
             </a:pPr>
             <a:r>
               <a:rPr lang="en-US" sz="2000" b="0" strike="noStrike" spc="-1">
-                <a:solidFill>
-                  <a:srgbClr val="000000"/>
-                </a:solidFill>
                 <a:latin typeface="Gill Sans MT"/>
               </a:rPr>
-              <a:t>Short for “backward propagation of errors”</a:t>
-            </a:r>
-          </a:p>
-          <a:p>
-            <a:pPr marL="228600" indent="-228240">
-              <a:lnSpc>
-                <a:spcPct val="120000"/>
-              </a:lnSpc>
-              <a:spcBef>
-                <a:spcPts val="1001"/>
-              </a:spcBef>
-              <a:buClr>
-                <a:srgbClr val="B71E42"/>
-              </a:buClr>
-              <a:buFont typeface="Arial"/>
-              <a:buChar char="•"/>
-            </a:pPr>
-            <a:r>
-              <a:rPr lang="en-US" sz="2000" b="0" strike="noStrike" spc="-1">
-                <a:solidFill>
-                  <a:srgbClr val="000000"/>
-                </a:solidFill>
-                <a:latin typeface="Gill Sans MT"/>
-              </a:rPr>
-              <a:t>An algorithm for gradient descent of artificial neural networks</a:t>
-            </a:r>
-          </a:p>
-          <a:p>
-            <a:pPr marL="228600" indent="-228240">
-              <a:lnSpc>
-                <a:spcPct val="120000"/>
-              </a:lnSpc>
-              <a:spcBef>
-                <a:spcPts val="1001"/>
-              </a:spcBef>
-              <a:buClr>
-                <a:srgbClr val="B71E42"/>
-              </a:buClr>
-              <a:buFont typeface="Arial"/>
-              <a:buChar char="•"/>
-            </a:pPr>
-            <a:r>
-              <a:rPr lang="en-US" sz="2000" b="0" strike="noStrike" spc="-1">
-                <a:solidFill>
-                  <a:srgbClr val="000000"/>
-                </a:solidFill>
-                <a:latin typeface="Gill Sans MT"/>
-              </a:rPr>
-              <a:t>Calculates the gradient (all partial derivatives) of the cost function with respect to the neural network’s weights.</a:t>
-            </a:r>
-          </a:p>
-          <a:p>
-            <a:pPr marL="228600" indent="-228240">
-              <a:lnSpc>
-                <a:spcPct val="120000"/>
-              </a:lnSpc>
-              <a:spcBef>
-                <a:spcPts val="1001"/>
-              </a:spcBef>
-              <a:buClr>
-                <a:srgbClr val="B71E42"/>
-              </a:buClr>
-              <a:buFont typeface="Arial"/>
-              <a:buChar char="•"/>
-            </a:pPr>
-            <a:r>
-              <a:rPr lang="en-US" sz="2000" b="0" strike="noStrike" spc="-1">
-                <a:solidFill>
-                  <a:srgbClr val="000000"/>
-                </a:solidFill>
-                <a:latin typeface="Gill Sans MT"/>
-              </a:rPr>
-              <a:t>Based on the chain rule for differentiating composition of functions, the algorithm computes partial derivatives of weights in the last layer first, then it computes partial derivatives for the second-to-last layer, and so on. Hence it is called “backpropagation”.</a:t>
-            </a:r>
+              <a:t> </a:t>
+            </a:r>
+            <a:endParaRPr lang="en-US" sz="2000" b="0" strike="noStrike" spc="-1">
+              <a:solidFill>
+                <a:srgbClr val="000000"/>
+              </a:solidFill>
+              <a:latin typeface="Gill Sans MT"/>
+            </a:endParaRPr>
           </a:p>
         </p:txBody>
       </p:sp>
@@ -9379,7 +8911,7 @@
       </p:grpSpPr>
       <p:sp>
         <p:nvSpPr>
-          <p:cNvPr id="155" name="TextShape 1"/>
+          <p:cNvPr id="153" name="TextShape 1"/>
           <p:cNvSpPr txBox="1"/>
           <p:nvPr/>
         </p:nvSpPr>
@@ -9412,7 +8944,7 @@
                 </a:solidFill>
                 <a:latin typeface="Gill Sans MT"/>
               </a:rPr>
-              <a:t>Discussion: why neural network?</a:t>
+              <a:t>backpropagation</a:t>
             </a:r>
             <a:endParaRPr lang="en-US" sz="3200" b="0" strike="noStrike" spc="-1">
               <a:solidFill>
@@ -9425,7 +8957,7 @@
       </p:sp>
       <p:sp>
         <p:nvSpPr>
-          <p:cNvPr id="156" name="TextShape 2"/>
+          <p:cNvPr id="154" name="TextShape 2"/>
           <p:cNvSpPr txBox="1"/>
           <p:nvPr/>
         </p:nvSpPr>
@@ -9466,7 +8998,7 @@
                 </a:solidFill>
                 <a:latin typeface="Gill Sans MT"/>
               </a:rPr>
-              <a:t>NNs frequently outperforms other ML techniques on very large and complex problems.</a:t>
+              <a:t>Short for “backward propagation of errors”</a:t>
             </a:r>
           </a:p>
           <a:p>
@@ -9490,7 +9022,7 @@
                 </a:solidFill>
                 <a:latin typeface="Gill Sans MT"/>
               </a:rPr>
-              <a:t>The tremendous increase in computing power makes it possible to train large neural networks in a reasonable amount of time.</a:t>
+              <a:t>An algorithm for gradient descent of artificial neural networks</a:t>
             </a:r>
           </a:p>
           <a:p>
@@ -9514,7 +9046,7 @@
                 </a:solidFill>
                 <a:latin typeface="Gill Sans MT"/>
               </a:rPr>
-              <a:t>The training algorithms have been improved.</a:t>
+              <a:t>Calculates the gradient (all partial derivatives) of the cost function with respect to the neural network’s weights.</a:t>
             </a:r>
           </a:p>
           <a:p>
@@ -9538,24 +9070,8 @@
                 </a:solidFill>
                 <a:latin typeface="Gill Sans MT"/>
               </a:rPr>
-              <a:t>Some theoretical limitations of NNs have turned out to be benign in practice.</a:t>
-            </a:r>
-          </a:p>
-          <a:p>
-            <a:pPr>
-              <a:lnSpc>
-                <a:spcPct val="120000"/>
-              </a:lnSpc>
-              <a:spcBef>
-                <a:spcPts val="1001"/>
-              </a:spcBef>
-            </a:pPr>
-            <a:endParaRPr lang="en-US" sz="2000" b="0" strike="noStrike" spc="-1">
-              <a:solidFill>
-                <a:srgbClr val="000000"/>
-              </a:solidFill>
-              <a:latin typeface="Gill Sans MT"/>
-            </a:endParaRPr>
+              <a:t>Based on the chain rule for differentiating composition of functions, the algorithm computes partial derivatives of weights in the last layer first, then it computes partial derivatives for the second-to-last layer, and so on. Hence it is called “backpropagation”.</a:t>
+            </a:r>
           </a:p>
         </p:txBody>
       </p:sp>
@@ -9613,7 +9129,7 @@
       </p:grpSpPr>
       <p:sp>
         <p:nvSpPr>
-          <p:cNvPr id="157" name="TextShape 1"/>
+          <p:cNvPr id="155" name="TextShape 1"/>
           <p:cNvSpPr txBox="1"/>
           <p:nvPr/>
         </p:nvSpPr>
@@ -9646,7 +9162,7 @@
                 </a:solidFill>
                 <a:latin typeface="Gill Sans MT"/>
               </a:rPr>
-              <a:t>Discussion</a:t>
+              <a:t>Discussion: why neural network?</a:t>
             </a:r>
             <a:endParaRPr lang="en-US" sz="3200" b="0" strike="noStrike" spc="-1">
               <a:solidFill>
@@ -9657,9 +9173,112 @@
           </a:p>
         </p:txBody>
       </p:sp>
-      <p:sp>
-        <p:nvSpPr>
-          <p:cNvPr id="158" name="TextShape 2"/>
+    </p:spTree>
+    <p:extLst>
+      <p:ext uri="{BB962C8B-B14F-4D97-AF65-F5344CB8AC3E}">
+        <p14:creationId xmlns:p14="http://schemas.microsoft.com/office/powerpoint/2010/main" val="1938811926"/>
+      </p:ext>
+    </p:extLst>
+  </p:cSld>
+  <p:clrMapOvr>
+    <a:masterClrMapping/>
+  </p:clrMapOvr>
+  <p:timing>
+    <p:tnLst>
+      <p:par>
+        <p:cTn id="1" dur="indefinite" restart="never" nodeType="tmRoot">
+          <p:childTnLst>
+            <p:seq>
+              <p:cTn id="2" dur="indefinite" nodeType="mainSeq"/>
+              <p:prevCondLst>
+                <p:cond evt="onPrev" delay="0">
+                  <p:tgtEl>
+                    <p:sldTgt/>
+                  </p:tgtEl>
+                </p:cond>
+              </p:prevCondLst>
+              <p:nextCondLst>
+                <p:cond evt="onNext" delay="0">
+                  <p:tgtEl>
+                    <p:sldTgt/>
+                  </p:tgtEl>
+                </p:cond>
+              </p:nextCondLst>
+            </p:seq>
+          </p:childTnLst>
+        </p:cTn>
+      </p:par>
+    </p:tnLst>
+  </p:timing>
+</p:sld>
+</file>
+
+<file path=ppt/slides/slide24.xml><?xml version="1.0" encoding="utf-8"?>
+<p:sld xmlns:a="http://schemas.openxmlformats.org/drawingml/2006/main" xmlns:r="http://schemas.openxmlformats.org/officeDocument/2006/relationships" xmlns:p="http://schemas.openxmlformats.org/presentationml/2006/main">
+  <p:cSld>
+    <p:spTree>
+      <p:nvGrpSpPr>
+        <p:cNvPr id="1" name=""/>
+        <p:cNvGrpSpPr/>
+        <p:nvPr/>
+      </p:nvGrpSpPr>
+      <p:grpSpPr>
+        <a:xfrm>
+          <a:off x="0" y="0"/>
+          <a:ext cx="0" cy="0"/>
+          <a:chOff x="0" y="0"/>
+          <a:chExt cx="0" cy="0"/>
+        </a:xfrm>
+      </p:grpSpPr>
+      <p:sp>
+        <p:nvSpPr>
+          <p:cNvPr id="155" name="TextShape 1"/>
+          <p:cNvSpPr txBox="1"/>
+          <p:nvPr/>
+        </p:nvSpPr>
+        <p:spPr>
+          <a:xfrm>
+            <a:off x="1451520" y="804600"/>
+            <a:ext cx="9603000" cy="1049040"/>
+          </a:xfrm>
+          <a:prstGeom prst="rect">
+            <a:avLst/>
+          </a:prstGeom>
+          <a:noFill/>
+          <a:ln>
+            <a:noFill/>
+          </a:ln>
+        </p:spPr>
+        <p:txBody>
+          <a:bodyPr/>
+          <a:lstStyle/>
+          <a:p>
+            <a:pPr>
+              <a:lnSpc>
+                <a:spcPct val="90000"/>
+              </a:lnSpc>
+            </a:pPr>
+            <a:r>
+              <a:rPr lang="en-US" sz="3200" b="0" strike="noStrike" cap="all" spc="-1">
+                <a:solidFill>
+                  <a:srgbClr val="000000"/>
+                </a:solidFill>
+                <a:latin typeface="Gill Sans MT"/>
+              </a:rPr>
+              <a:t>Discussion: why neural network?</a:t>
+            </a:r>
+            <a:endParaRPr lang="en-US" sz="3200" b="0" strike="noStrike" spc="-1">
+              <a:solidFill>
+                <a:srgbClr val="000000"/>
+              </a:solidFill>
+              <a:latin typeface="Gill Sans MT"/>
+            </a:endParaRPr>
+          </a:p>
+        </p:txBody>
+      </p:sp>
+      <p:sp>
+        <p:nvSpPr>
+          <p:cNvPr id="156" name="TextShape 2"/>
           <p:cNvSpPr txBox="1"/>
           <p:nvPr/>
         </p:nvSpPr>
@@ -9694,13 +9313,13 @@
               <a:buChar char="•"/>
             </a:pPr>
             <a:r>
-              <a:rPr lang="en-US" sz="2000" b="0" strike="noStrike" spc="-1">
+              <a:rPr lang="en-US" sz="2000" b="0" strike="noStrike" spc="-1" dirty="0">
                 <a:solidFill>
                   <a:srgbClr val="000000"/>
                 </a:solidFill>
                 <a:latin typeface="Gill Sans MT"/>
               </a:rPr>
-              <a:t>Huge number of parameters: slow to use, prone to overfitting.</a:t>
+              <a:t>NNs outperforms other ML techniques on large and complex problems.</a:t>
             </a:r>
           </a:p>
           <a:p>
@@ -9718,13 +9337,13 @@
               <a:buChar char="•"/>
             </a:pPr>
             <a:r>
-              <a:rPr lang="en-US" sz="2000" b="0" strike="noStrike" spc="-1">
+              <a:rPr lang="en-US" sz="2000" b="0" strike="noStrike" spc="-1" dirty="0">
                 <a:solidFill>
                   <a:srgbClr val="000000"/>
                 </a:solidFill>
                 <a:latin typeface="Gill Sans MT"/>
               </a:rPr>
-              <a:t>Black box model: hard to understand the decision rules</a:t>
+              <a:t>The tremendous increase in computing power makes it possible to train large neural networks in a reasonable amount of time.</a:t>
             </a:r>
           </a:p>
           <a:p>
@@ -9742,13 +9361,37 @@
               <a:buChar char="•"/>
             </a:pPr>
             <a:r>
-              <a:rPr lang="en-US" sz="2000" b="0" strike="noStrike" spc="-1">
+              <a:rPr lang="en-US" sz="2000" b="0" strike="noStrike" spc="-1" dirty="0">
                 <a:solidFill>
                   <a:srgbClr val="000000"/>
                 </a:solidFill>
                 <a:latin typeface="Gill Sans MT"/>
               </a:rPr>
-              <a:t>Variations: Convolutional Neural Networks (CNN), Recurrent Neural Networks (RNN)</a:t>
+              <a:t>The training algorithms have been improved.</a:t>
+            </a:r>
+          </a:p>
+          <a:p>
+            <a:pPr marL="228600" indent="-228240">
+              <a:lnSpc>
+                <a:spcPct val="120000"/>
+              </a:lnSpc>
+              <a:spcBef>
+                <a:spcPts val="1001"/>
+              </a:spcBef>
+              <a:buClr>
+                <a:srgbClr val="B71E42"/>
+              </a:buClr>
+              <a:buFont typeface="Arial"/>
+              <a:buChar char="•"/>
+            </a:pPr>
+            <a:r>
+              <a:rPr lang="en-US" sz="2000" b="0" strike="noStrike" spc="-1" dirty="0">
+                <a:solidFill>
+                  <a:srgbClr val="000000"/>
+                </a:solidFill>
+                <a:latin typeface="Gill Sans MT"/>
+              </a:rPr>
+              <a:t>Some theoretical limitations of NNs have turned out to be benign in practice.</a:t>
             </a:r>
           </a:p>
           <a:p>
@@ -9760,7 +9403,320 @@
                 <a:spcPts val="1001"/>
               </a:spcBef>
             </a:pPr>
-            <a:endParaRPr lang="en-US" sz="2000" b="0" strike="noStrike" spc="-1">
+            <a:endParaRPr lang="en-US" sz="2000" b="0" strike="noStrike" spc="-1" dirty="0">
+              <a:solidFill>
+                <a:srgbClr val="000000"/>
+              </a:solidFill>
+              <a:latin typeface="Gill Sans MT"/>
+            </a:endParaRPr>
+          </a:p>
+        </p:txBody>
+      </p:sp>
+    </p:spTree>
+  </p:cSld>
+  <p:clrMapOvr>
+    <a:masterClrMapping/>
+  </p:clrMapOvr>
+  <p:timing>
+    <p:tnLst>
+      <p:par>
+        <p:cTn id="1" dur="indefinite" restart="never" nodeType="tmRoot">
+          <p:childTnLst>
+            <p:seq>
+              <p:cTn id="2" dur="indefinite" nodeType="mainSeq"/>
+              <p:prevCondLst>
+                <p:cond evt="onPrev" delay="0">
+                  <p:tgtEl>
+                    <p:sldTgt/>
+                  </p:tgtEl>
+                </p:cond>
+              </p:prevCondLst>
+              <p:nextCondLst>
+                <p:cond evt="onNext" delay="0">
+                  <p:tgtEl>
+                    <p:sldTgt/>
+                  </p:tgtEl>
+                </p:cond>
+              </p:nextCondLst>
+            </p:seq>
+          </p:childTnLst>
+        </p:cTn>
+      </p:par>
+    </p:tnLst>
+  </p:timing>
+</p:sld>
+</file>
+
+<file path=ppt/slides/slide25.xml><?xml version="1.0" encoding="utf-8"?>
+<p:sld xmlns:a="http://schemas.openxmlformats.org/drawingml/2006/main" xmlns:r="http://schemas.openxmlformats.org/officeDocument/2006/relationships" xmlns:p="http://schemas.openxmlformats.org/presentationml/2006/main">
+  <p:cSld>
+    <p:spTree>
+      <p:nvGrpSpPr>
+        <p:cNvPr id="1" name=""/>
+        <p:cNvGrpSpPr/>
+        <p:nvPr/>
+      </p:nvGrpSpPr>
+      <p:grpSpPr>
+        <a:xfrm>
+          <a:off x="0" y="0"/>
+          <a:ext cx="0" cy="0"/>
+          <a:chOff x="0" y="0"/>
+          <a:chExt cx="0" cy="0"/>
+        </a:xfrm>
+      </p:grpSpPr>
+      <p:sp>
+        <p:nvSpPr>
+          <p:cNvPr id="157" name="TextShape 1"/>
+          <p:cNvSpPr txBox="1"/>
+          <p:nvPr/>
+        </p:nvSpPr>
+        <p:spPr>
+          <a:xfrm>
+            <a:off x="1451520" y="804600"/>
+            <a:ext cx="9603000" cy="1049040"/>
+          </a:xfrm>
+          <a:prstGeom prst="rect">
+            <a:avLst/>
+          </a:prstGeom>
+          <a:noFill/>
+          <a:ln>
+            <a:noFill/>
+          </a:ln>
+        </p:spPr>
+        <p:txBody>
+          <a:bodyPr/>
+          <a:lstStyle/>
+          <a:p>
+            <a:pPr>
+              <a:lnSpc>
+                <a:spcPct val="90000"/>
+              </a:lnSpc>
+            </a:pPr>
+            <a:r>
+              <a:rPr lang="en-US" sz="3200" b="0" strike="noStrike" cap="all" spc="-1" dirty="0">
+                <a:solidFill>
+                  <a:srgbClr val="000000"/>
+                </a:solidFill>
+                <a:latin typeface="Gill Sans MT"/>
+              </a:rPr>
+              <a:t>Discussion: WHY NOT NEURAL NETWORK?</a:t>
+            </a:r>
+            <a:endParaRPr lang="en-US" sz="3200" b="0" strike="noStrike" spc="-1" dirty="0">
+              <a:solidFill>
+                <a:srgbClr val="000000"/>
+              </a:solidFill>
+              <a:latin typeface="Gill Sans MT"/>
+            </a:endParaRPr>
+          </a:p>
+        </p:txBody>
+      </p:sp>
+    </p:spTree>
+    <p:extLst>
+      <p:ext uri="{BB962C8B-B14F-4D97-AF65-F5344CB8AC3E}">
+        <p14:creationId xmlns:p14="http://schemas.microsoft.com/office/powerpoint/2010/main" val="830693330"/>
+      </p:ext>
+    </p:extLst>
+  </p:cSld>
+  <p:clrMapOvr>
+    <a:masterClrMapping/>
+  </p:clrMapOvr>
+  <p:timing>
+    <p:tnLst>
+      <p:par>
+        <p:cTn id="1" dur="indefinite" restart="never" nodeType="tmRoot">
+          <p:childTnLst>
+            <p:seq>
+              <p:cTn id="2" dur="indefinite" nodeType="mainSeq"/>
+              <p:prevCondLst>
+                <p:cond evt="onPrev" delay="0">
+                  <p:tgtEl>
+                    <p:sldTgt/>
+                  </p:tgtEl>
+                </p:cond>
+              </p:prevCondLst>
+              <p:nextCondLst>
+                <p:cond evt="onNext" delay="0">
+                  <p:tgtEl>
+                    <p:sldTgt/>
+                  </p:tgtEl>
+                </p:cond>
+              </p:nextCondLst>
+            </p:seq>
+          </p:childTnLst>
+        </p:cTn>
+      </p:par>
+    </p:tnLst>
+  </p:timing>
+</p:sld>
+</file>
+
+<file path=ppt/slides/slide26.xml><?xml version="1.0" encoding="utf-8"?>
+<p:sld xmlns:a="http://schemas.openxmlformats.org/drawingml/2006/main" xmlns:r="http://schemas.openxmlformats.org/officeDocument/2006/relationships" xmlns:p="http://schemas.openxmlformats.org/presentationml/2006/main">
+  <p:cSld>
+    <p:spTree>
+      <p:nvGrpSpPr>
+        <p:cNvPr id="1" name=""/>
+        <p:cNvGrpSpPr/>
+        <p:nvPr/>
+      </p:nvGrpSpPr>
+      <p:grpSpPr>
+        <a:xfrm>
+          <a:off x="0" y="0"/>
+          <a:ext cx="0" cy="0"/>
+          <a:chOff x="0" y="0"/>
+          <a:chExt cx="0" cy="0"/>
+        </a:xfrm>
+      </p:grpSpPr>
+      <p:sp>
+        <p:nvSpPr>
+          <p:cNvPr id="157" name="TextShape 1"/>
+          <p:cNvSpPr txBox="1"/>
+          <p:nvPr/>
+        </p:nvSpPr>
+        <p:spPr>
+          <a:xfrm>
+            <a:off x="1451520" y="804600"/>
+            <a:ext cx="9603000" cy="1049040"/>
+          </a:xfrm>
+          <a:prstGeom prst="rect">
+            <a:avLst/>
+          </a:prstGeom>
+          <a:noFill/>
+          <a:ln>
+            <a:noFill/>
+          </a:ln>
+        </p:spPr>
+        <p:txBody>
+          <a:bodyPr/>
+          <a:lstStyle/>
+          <a:p>
+            <a:pPr>
+              <a:lnSpc>
+                <a:spcPct val="90000"/>
+              </a:lnSpc>
+            </a:pPr>
+            <a:r>
+              <a:rPr lang="en-US" sz="3200" b="0" strike="noStrike" cap="all" spc="-1" dirty="0">
+                <a:solidFill>
+                  <a:srgbClr val="000000"/>
+                </a:solidFill>
+                <a:latin typeface="Gill Sans MT"/>
+              </a:rPr>
+              <a:t>Discussion: WHY NOT NEURAL NETWORK?</a:t>
+            </a:r>
+            <a:endParaRPr lang="en-US" sz="3200" b="0" strike="noStrike" spc="-1" dirty="0">
+              <a:solidFill>
+                <a:srgbClr val="000000"/>
+              </a:solidFill>
+              <a:latin typeface="Gill Sans MT"/>
+            </a:endParaRPr>
+          </a:p>
+        </p:txBody>
+      </p:sp>
+      <p:sp>
+        <p:nvSpPr>
+          <p:cNvPr id="158" name="TextShape 2"/>
+          <p:cNvSpPr txBox="1"/>
+          <p:nvPr/>
+        </p:nvSpPr>
+        <p:spPr>
+          <a:xfrm>
+            <a:off x="1451520" y="2015640"/>
+            <a:ext cx="9603000" cy="3450240"/>
+          </a:xfrm>
+          <a:prstGeom prst="rect">
+            <a:avLst/>
+          </a:prstGeom>
+          <a:noFill/>
+          <a:ln>
+            <a:noFill/>
+          </a:ln>
+        </p:spPr>
+        <p:txBody>
+          <a:bodyPr/>
+          <a:lstStyle/>
+          <a:p>
+            <a:pPr marL="228600" indent="-228240">
+              <a:lnSpc>
+                <a:spcPct val="120000"/>
+              </a:lnSpc>
+              <a:spcBef>
+                <a:spcPts val="1001"/>
+              </a:spcBef>
+              <a:buClr>
+                <a:srgbClr val="B71E42"/>
+              </a:buClr>
+              <a:buFont typeface="Arial"/>
+              <a:buChar char="•"/>
+            </a:pPr>
+            <a:r>
+              <a:rPr lang="en-US" sz="2000" b="0" strike="noStrike" spc="-1" dirty="0">
+                <a:solidFill>
+                  <a:srgbClr val="000000"/>
+                </a:solidFill>
+                <a:latin typeface="Gill Sans MT"/>
+              </a:rPr>
+              <a:t>Huge number of parameters: slow to use, prone to overfitting.</a:t>
+            </a:r>
+          </a:p>
+          <a:p>
+            <a:pPr marL="228600" indent="-228240">
+              <a:lnSpc>
+                <a:spcPct val="120000"/>
+              </a:lnSpc>
+              <a:spcBef>
+                <a:spcPts val="1001"/>
+              </a:spcBef>
+              <a:buClr>
+                <a:srgbClr val="B71E42"/>
+              </a:buClr>
+              <a:buFont typeface="Arial"/>
+              <a:buChar char="•"/>
+            </a:pPr>
+            <a:r>
+              <a:rPr lang="en-US" sz="2000" b="0" strike="noStrike" spc="-1" dirty="0">
+                <a:solidFill>
+                  <a:srgbClr val="000000"/>
+                </a:solidFill>
+                <a:latin typeface="Gill Sans MT"/>
+              </a:rPr>
+              <a:t>Black box model: hard to understand the decision rules</a:t>
+            </a:r>
+          </a:p>
+          <a:p>
+            <a:pPr marL="228600" indent="-228240">
+              <a:lnSpc>
+                <a:spcPct val="120000"/>
+              </a:lnSpc>
+              <a:spcBef>
+                <a:spcPts val="1001"/>
+              </a:spcBef>
+              <a:buClr>
+                <a:srgbClr val="B71E42"/>
+              </a:buClr>
+              <a:buFont typeface="Arial"/>
+              <a:buChar char="•"/>
+            </a:pPr>
+            <a:r>
+              <a:rPr lang="en-US" sz="2000" b="0" strike="noStrike" spc="-1" dirty="0">
+                <a:solidFill>
+                  <a:srgbClr val="000000"/>
+                </a:solidFill>
+                <a:latin typeface="Gill Sans MT"/>
+              </a:rPr>
+              <a:t>Variations: Convolutional Neural Networks (CNN), Recurrent Neural Networks (RNN)</a:t>
+            </a:r>
+          </a:p>
+          <a:p>
+            <a:pPr>
+              <a:lnSpc>
+                <a:spcPct val="120000"/>
+              </a:lnSpc>
+              <a:spcBef>
+                <a:spcPts val="1001"/>
+              </a:spcBef>
+            </a:pPr>
+            <a:endParaRPr lang="en-US" sz="2000" b="0" strike="noStrike" spc="-1" dirty="0">
               <a:solidFill>
                 <a:srgbClr val="000000"/>
               </a:solidFill>

</xml_diff>